<commit_message>
updated names on slides.
</commit_message>
<xml_diff>
--- a/Google BigQuery.pptx
+++ b/Google BigQuery.pptx
@@ -4897,7 +4897,11 @@
           <a:p>
             <a:r>
               <a:rPr lang="en-US" dirty="0" smtClean="0"/>
-              <a:t>Thank you !</a:t>
+              <a:t> Thank </a:t>
+            </a:r>
+            <a:r>
+              <a:rPr lang="en-US" dirty="0" smtClean="0"/>
+              <a:t>you !</a:t>
             </a:r>
             <a:endParaRPr lang="en-US" dirty="0"/>
           </a:p>
@@ -5600,8 +5604,8 @@
         </p:nvSpPr>
         <p:spPr>
           <a:xfrm>
-            <a:off x="9142412" y="6070600"/>
-            <a:ext cx="2367123" cy="369332"/>
+            <a:off x="8990012" y="6070600"/>
+            <a:ext cx="2825710" cy="369332"/>
           </a:xfrm>
           <a:prstGeom prst="rect">
             <a:avLst/>
@@ -5614,9 +5618,18 @@
           <a:lstStyle/>
           <a:p>
             <a:r>
+              <a:rPr lang="en-US" dirty="0" err="1"/>
+              <a:t>Prajakt</a:t>
+            </a:r>
+            <a:r>
               <a:rPr lang="en-US" dirty="0"/>
-              <a:t>Vijay Kumar Karanam</a:t>
-            </a:r>
+              <a:t> Uttamrao </a:t>
+            </a:r>
+            <a:r>
+              <a:rPr lang="en-US" dirty="0" err="1"/>
+              <a:t>Khawase</a:t>
+            </a:r>
+            <a:endParaRPr lang="en-US" dirty="0"/>
           </a:p>
         </p:txBody>
       </p:sp>
@@ -5766,8 +5779,8 @@
         </p:nvSpPr>
         <p:spPr>
           <a:xfrm>
-            <a:off x="8990012" y="5878342"/>
-            <a:ext cx="2367123" cy="369332"/>
+            <a:off x="8380412" y="5885934"/>
+            <a:ext cx="3462743" cy="369332"/>
           </a:xfrm>
           <a:prstGeom prst="rect">
             <a:avLst/>
@@ -5780,9 +5793,14 @@
           <a:lstStyle/>
           <a:p>
             <a:r>
+              <a:rPr lang="en-US" dirty="0" err="1"/>
+              <a:t>Harsha</a:t>
+            </a:r>
+            <a:r>
               <a:rPr lang="en-US" dirty="0"/>
-              <a:t>Vijay Kumar Karanam</a:t>
-            </a:r>
+              <a:t> Vardhan Reddy Nallavolu</a:t>
+            </a:r>
+            <a:endParaRPr lang="en-US" dirty="0"/>
           </a:p>
         </p:txBody>
       </p:sp>
@@ -5921,8 +5939,8 @@
         </p:nvSpPr>
         <p:spPr>
           <a:xfrm>
-            <a:off x="9142412" y="5941479"/>
-            <a:ext cx="2367123" cy="369332"/>
+            <a:off x="8380412" y="5930594"/>
+            <a:ext cx="3462743" cy="369332"/>
           </a:xfrm>
           <a:prstGeom prst="rect">
             <a:avLst/>
@@ -5935,9 +5953,14 @@
           <a:lstStyle/>
           <a:p>
             <a:r>
+              <a:rPr lang="en-US" dirty="0" err="1"/>
+              <a:t>Harsha</a:t>
+            </a:r>
+            <a:r>
               <a:rPr lang="en-US" dirty="0"/>
-              <a:t>Vijay Kumar Karanam</a:t>
-            </a:r>
+              <a:t> Vardhan Reddy Nallavolu</a:t>
+            </a:r>
+            <a:endParaRPr lang="en-US" dirty="0"/>
           </a:p>
         </p:txBody>
       </p:sp>
@@ -6848,6 +6871,132 @@
 </file>
 
 <file path=customXml/item2.xml><?xml version="1.0" encoding="utf-8"?>
+<p:properties xmlns:p="http://schemas.microsoft.com/office/2006/metadata/properties" xmlns:xsi="http://www.w3.org/2001/XMLSchema-instance" xmlns:pc="http://schemas.microsoft.com/office/infopath/2007/PartnerControls">
+  <documentManagement>
+    <DirectSourceMarket xmlns="4873beb7-5857-4685-be1f-d57550cc96cc" xsi:nil="true"/>
+    <ApprovalStatus xmlns="4873beb7-5857-4685-be1f-d57550cc96cc">InProgress</ApprovalStatus>
+    <MarketSpecific xmlns="4873beb7-5857-4685-be1f-d57550cc96cc">false</MarketSpecific>
+    <LocComments xmlns="4873beb7-5857-4685-be1f-d57550cc96cc" xsi:nil="true"/>
+    <ThumbnailAssetId xmlns="4873beb7-5857-4685-be1f-d57550cc96cc" xsi:nil="true"/>
+    <PrimaryImageGen xmlns="4873beb7-5857-4685-be1f-d57550cc96cc">false</PrimaryImageGen>
+    <LegacyData xmlns="4873beb7-5857-4685-be1f-d57550cc96cc" xsi:nil="true"/>
+    <LocRecommendedHandoff xmlns="4873beb7-5857-4685-be1f-d57550cc96cc" xsi:nil="true"/>
+    <BusinessGroup xmlns="4873beb7-5857-4685-be1f-d57550cc96cc" xsi:nil="true"/>
+    <BlockPublish xmlns="4873beb7-5857-4685-be1f-d57550cc96cc">false</BlockPublish>
+    <TPFriendlyName xmlns="4873beb7-5857-4685-be1f-d57550cc96cc" xsi:nil="true"/>
+    <NumericId xmlns="4873beb7-5857-4685-be1f-d57550cc96cc" xsi:nil="true"/>
+    <APEditor xmlns="4873beb7-5857-4685-be1f-d57550cc96cc">
+      <UserInfo>
+        <DisplayName/>
+        <AccountId xsi:nil="true"/>
+        <AccountType/>
+      </UserInfo>
+    </APEditor>
+    <SourceTitle xmlns="4873beb7-5857-4685-be1f-d57550cc96cc" xsi:nil="true"/>
+    <OpenTemplate xmlns="4873beb7-5857-4685-be1f-d57550cc96cc">true</OpenTemplate>
+    <UALocComments xmlns="4873beb7-5857-4685-be1f-d57550cc96cc" xsi:nil="true"/>
+    <ParentAssetId xmlns="4873beb7-5857-4685-be1f-d57550cc96cc" xsi:nil="true"/>
+    <IntlLangReviewDate xmlns="4873beb7-5857-4685-be1f-d57550cc96cc" xsi:nil="true"/>
+    <FeatureTagsTaxHTField0 xmlns="4873beb7-5857-4685-be1f-d57550cc96cc">
+      <Terms xmlns="http://schemas.microsoft.com/office/infopath/2007/PartnerControls"/>
+    </FeatureTagsTaxHTField0>
+    <PublishStatusLookup xmlns="4873beb7-5857-4685-be1f-d57550cc96cc">
+      <Value>1360476</Value>
+    </PublishStatusLookup>
+    <Providers xmlns="4873beb7-5857-4685-be1f-d57550cc96cc" xsi:nil="true"/>
+    <MachineTranslated xmlns="4873beb7-5857-4685-be1f-d57550cc96cc">false</MachineTranslated>
+    <OriginalSourceMarket xmlns="4873beb7-5857-4685-be1f-d57550cc96cc" xsi:nil="true"/>
+    <APDescription xmlns="4873beb7-5857-4685-be1f-d57550cc96cc" xsi:nil="true"/>
+    <ClipArtFilename xmlns="4873beb7-5857-4685-be1f-d57550cc96cc" xsi:nil="true"/>
+    <ContentItem xmlns="4873beb7-5857-4685-be1f-d57550cc96cc" xsi:nil="true"/>
+    <TPInstallLocation xmlns="4873beb7-5857-4685-be1f-d57550cc96cc" xsi:nil="true"/>
+    <PublishTargets xmlns="4873beb7-5857-4685-be1f-d57550cc96cc">OfficeOnlineVNext</PublishTargets>
+    <TimesCloned xmlns="4873beb7-5857-4685-be1f-d57550cc96cc" xsi:nil="true"/>
+    <AssetStart xmlns="4873beb7-5857-4685-be1f-d57550cc96cc">2011-12-12T13:37:00+00:00</AssetStart>
+    <Provider xmlns="4873beb7-5857-4685-be1f-d57550cc96cc" xsi:nil="true"/>
+    <AcquiredFrom xmlns="4873beb7-5857-4685-be1f-d57550cc96cc">Internal MS</AcquiredFrom>
+    <FriendlyTitle xmlns="4873beb7-5857-4685-be1f-d57550cc96cc" xsi:nil="true"/>
+    <LastHandOff xmlns="4873beb7-5857-4685-be1f-d57550cc96cc" xsi:nil="true"/>
+    <TPClientViewer xmlns="4873beb7-5857-4685-be1f-d57550cc96cc" xsi:nil="true"/>
+    <UACurrentWords xmlns="4873beb7-5857-4685-be1f-d57550cc96cc" xsi:nil="true"/>
+    <ArtSampleDocs xmlns="4873beb7-5857-4685-be1f-d57550cc96cc" xsi:nil="true"/>
+    <UALocRecommendation xmlns="4873beb7-5857-4685-be1f-d57550cc96cc">Localize</UALocRecommendation>
+    <Manager xmlns="4873beb7-5857-4685-be1f-d57550cc96cc" xsi:nil="true"/>
+    <ShowIn xmlns="4873beb7-5857-4685-be1f-d57550cc96cc">Show everywhere</ShowIn>
+    <UANotes xmlns="4873beb7-5857-4685-be1f-d57550cc96cc" xsi:nil="true"/>
+    <TemplateStatus xmlns="4873beb7-5857-4685-be1f-d57550cc96cc">Complete</TemplateStatus>
+    <InternalTagsTaxHTField0 xmlns="4873beb7-5857-4685-be1f-d57550cc96cc">
+      <Terms xmlns="http://schemas.microsoft.com/office/infopath/2007/PartnerControls"/>
+    </InternalTagsTaxHTField0>
+    <CSXHash xmlns="4873beb7-5857-4685-be1f-d57550cc96cc" xsi:nil="true"/>
+    <Downloads xmlns="4873beb7-5857-4685-be1f-d57550cc96cc">0</Downloads>
+    <VoteCount xmlns="4873beb7-5857-4685-be1f-d57550cc96cc" xsi:nil="true"/>
+    <OOCacheId xmlns="4873beb7-5857-4685-be1f-d57550cc96cc" xsi:nil="true"/>
+    <IsDeleted xmlns="4873beb7-5857-4685-be1f-d57550cc96cc">false</IsDeleted>
+    <AssetExpire xmlns="4873beb7-5857-4685-be1f-d57550cc96cc">2035-01-01T08:00:00+00:00</AssetExpire>
+    <DSATActionTaken xmlns="4873beb7-5857-4685-be1f-d57550cc96cc" xsi:nil="true"/>
+    <CSXSubmissionMarket xmlns="4873beb7-5857-4685-be1f-d57550cc96cc" xsi:nil="true"/>
+    <TPExecutable xmlns="4873beb7-5857-4685-be1f-d57550cc96cc" xsi:nil="true"/>
+    <SubmitterId xmlns="4873beb7-5857-4685-be1f-d57550cc96cc" xsi:nil="true"/>
+    <EditorialTags xmlns="4873beb7-5857-4685-be1f-d57550cc96cc" xsi:nil="true"/>
+    <ApprovalLog xmlns="4873beb7-5857-4685-be1f-d57550cc96cc" xsi:nil="true"/>
+    <AssetType xmlns="4873beb7-5857-4685-be1f-d57550cc96cc">TP</AssetType>
+    <BugNumber xmlns="4873beb7-5857-4685-be1f-d57550cc96cc" xsi:nil="true"/>
+    <CSXSubmissionDate xmlns="4873beb7-5857-4685-be1f-d57550cc96cc" xsi:nil="true"/>
+    <CSXUpdate xmlns="4873beb7-5857-4685-be1f-d57550cc96cc">false</CSXUpdate>
+    <Milestone xmlns="4873beb7-5857-4685-be1f-d57550cc96cc" xsi:nil="true"/>
+    <RecommendationsModifier xmlns="4873beb7-5857-4685-be1f-d57550cc96cc" xsi:nil="true"/>
+    <OriginAsset xmlns="4873beb7-5857-4685-be1f-d57550cc96cc" xsi:nil="true"/>
+    <TPComponent xmlns="4873beb7-5857-4685-be1f-d57550cc96cc" xsi:nil="true"/>
+    <AssetId xmlns="4873beb7-5857-4685-be1f-d57550cc96cc">TP102801058</AssetId>
+    <IntlLocPriority xmlns="4873beb7-5857-4685-be1f-d57550cc96cc" xsi:nil="true"/>
+    <PolicheckWords xmlns="4873beb7-5857-4685-be1f-d57550cc96cc" xsi:nil="true"/>
+    <TPLaunchHelpLink xmlns="4873beb7-5857-4685-be1f-d57550cc96cc" xsi:nil="true"/>
+    <TPApplication xmlns="4873beb7-5857-4685-be1f-d57550cc96cc" xsi:nil="true"/>
+    <CrawlForDependencies xmlns="4873beb7-5857-4685-be1f-d57550cc96cc">false</CrawlForDependencies>
+    <HandoffToMSDN xmlns="4873beb7-5857-4685-be1f-d57550cc96cc" xsi:nil="true"/>
+    <PlannedPubDate xmlns="4873beb7-5857-4685-be1f-d57550cc96cc" xsi:nil="true"/>
+    <IntlLangReviewer xmlns="4873beb7-5857-4685-be1f-d57550cc96cc" xsi:nil="true"/>
+    <TrustLevel xmlns="4873beb7-5857-4685-be1f-d57550cc96cc">1 Microsoft Managed Content</TrustLevel>
+    <LocLastLocAttemptVersionLookup xmlns="4873beb7-5857-4685-be1f-d57550cc96cc">706496</LocLastLocAttemptVersionLookup>
+    <IsSearchable xmlns="4873beb7-5857-4685-be1f-d57550cc96cc">true</IsSearchable>
+    <TemplateTemplateType xmlns="4873beb7-5857-4685-be1f-d57550cc96cc">PowerPoint Presentation Template</TemplateTemplateType>
+    <CampaignTagsTaxHTField0 xmlns="4873beb7-5857-4685-be1f-d57550cc96cc">
+      <Terms xmlns="http://schemas.microsoft.com/office/infopath/2007/PartnerControls"/>
+    </CampaignTagsTaxHTField0>
+    <TPNamespace xmlns="4873beb7-5857-4685-be1f-d57550cc96cc" xsi:nil="true"/>
+    <TaxCatchAll xmlns="4873beb7-5857-4685-be1f-d57550cc96cc"/>
+    <Markets xmlns="4873beb7-5857-4685-be1f-d57550cc96cc"/>
+    <UAProjectedTotalWords xmlns="4873beb7-5857-4685-be1f-d57550cc96cc" xsi:nil="true"/>
+    <IntlLangReview xmlns="4873beb7-5857-4685-be1f-d57550cc96cc">false</IntlLangReview>
+    <OutputCachingOn xmlns="4873beb7-5857-4685-be1f-d57550cc96cc">false</OutputCachingOn>
+    <AverageRating xmlns="4873beb7-5857-4685-be1f-d57550cc96cc" xsi:nil="true"/>
+    <APAuthor xmlns="4873beb7-5857-4685-be1f-d57550cc96cc">
+      <UserInfo>
+        <DisplayName>REDMOND\v-soujap</DisplayName>
+        <AccountId>1954</AccountId>
+        <AccountType/>
+      </UserInfo>
+    </APAuthor>
+    <LocManualTestRequired xmlns="4873beb7-5857-4685-be1f-d57550cc96cc">false</LocManualTestRequired>
+    <TPCommandLine xmlns="4873beb7-5857-4685-be1f-d57550cc96cc" xsi:nil="true"/>
+    <TPAppVersion xmlns="4873beb7-5857-4685-be1f-d57550cc96cc" xsi:nil="true"/>
+    <EditorialStatus xmlns="4873beb7-5857-4685-be1f-d57550cc96cc">Complete</EditorialStatus>
+    <LastModifiedDateTime xmlns="4873beb7-5857-4685-be1f-d57550cc96cc" xsi:nil="true"/>
+    <ScenarioTagsTaxHTField0 xmlns="4873beb7-5857-4685-be1f-d57550cc96cc">
+      <Terms xmlns="http://schemas.microsoft.com/office/infopath/2007/PartnerControls"/>
+    </ScenarioTagsTaxHTField0>
+    <OriginalRelease xmlns="4873beb7-5857-4685-be1f-d57550cc96cc">14</OriginalRelease>
+    <TPLaunchHelpLinkType xmlns="4873beb7-5857-4685-be1f-d57550cc96cc">Template</TPLaunchHelpLinkType>
+    <LocalizationTagsTaxHTField0 xmlns="4873beb7-5857-4685-be1f-d57550cc96cc">
+      <Terms xmlns="http://schemas.microsoft.com/office/infopath/2007/PartnerControls"/>
+    </LocalizationTagsTaxHTField0>
+    <LocMarketGroupTiers2 xmlns="4873beb7-5857-4685-be1f-d57550cc96cc" xsi:nil="true"/>
+  </documentManagement>
+</p:properties>
+</file>
+
+<file path=customXml/item3.xml><?xml version="1.0" encoding="utf-8"?>
 <ct:contentTypeSchema xmlns:ct="http://schemas.microsoft.com/office/2006/metadata/contentType" xmlns:ma="http://schemas.microsoft.com/office/2006/metadata/properties/metaAttributes" ct:_="" ma:_="" ma:contentTypeName="TemplateFile" ma:contentTypeID="0x0101006EDDDB5EE6D98C44930B742096920B300400F5B6D36B3EF94B4E9A635CDF2A18F5B8" ma:contentTypeVersion="72" ma:contentTypeDescription="Create a new document." ma:contentTypeScope="" ma:versionID="a23e56308344d904b51738559c3d67c9">
   <xsd:schema xmlns:xsd="http://www.w3.org/2001/XMLSchema" xmlns:xs="http://www.w3.org/2001/XMLSchema" xmlns:p="http://schemas.microsoft.com/office/2006/metadata/properties" xmlns:ns2="4873beb7-5857-4685-be1f-d57550cc96cc" targetNamespace="http://schemas.microsoft.com/office/2006/metadata/properties" ma:root="true" ma:fieldsID="cd0908cc4600e77bf5da051303e00c8d" ns2:_="">
     <xsd:import namespace="4873beb7-5857-4685-be1f-d57550cc96cc"/>
@@ -7887,132 +8036,6 @@
 </ct:contentTypeSchema>
 </file>
 
-<file path=customXml/item3.xml><?xml version="1.0" encoding="utf-8"?>
-<p:properties xmlns:p="http://schemas.microsoft.com/office/2006/metadata/properties" xmlns:xsi="http://www.w3.org/2001/XMLSchema-instance" xmlns:pc="http://schemas.microsoft.com/office/infopath/2007/PartnerControls">
-  <documentManagement>
-    <DirectSourceMarket xmlns="4873beb7-5857-4685-be1f-d57550cc96cc" xsi:nil="true"/>
-    <ApprovalStatus xmlns="4873beb7-5857-4685-be1f-d57550cc96cc">InProgress</ApprovalStatus>
-    <MarketSpecific xmlns="4873beb7-5857-4685-be1f-d57550cc96cc">false</MarketSpecific>
-    <LocComments xmlns="4873beb7-5857-4685-be1f-d57550cc96cc" xsi:nil="true"/>
-    <ThumbnailAssetId xmlns="4873beb7-5857-4685-be1f-d57550cc96cc" xsi:nil="true"/>
-    <PrimaryImageGen xmlns="4873beb7-5857-4685-be1f-d57550cc96cc">false</PrimaryImageGen>
-    <LegacyData xmlns="4873beb7-5857-4685-be1f-d57550cc96cc" xsi:nil="true"/>
-    <LocRecommendedHandoff xmlns="4873beb7-5857-4685-be1f-d57550cc96cc" xsi:nil="true"/>
-    <BusinessGroup xmlns="4873beb7-5857-4685-be1f-d57550cc96cc" xsi:nil="true"/>
-    <BlockPublish xmlns="4873beb7-5857-4685-be1f-d57550cc96cc">false</BlockPublish>
-    <TPFriendlyName xmlns="4873beb7-5857-4685-be1f-d57550cc96cc" xsi:nil="true"/>
-    <NumericId xmlns="4873beb7-5857-4685-be1f-d57550cc96cc" xsi:nil="true"/>
-    <APEditor xmlns="4873beb7-5857-4685-be1f-d57550cc96cc">
-      <UserInfo>
-        <DisplayName/>
-        <AccountId xsi:nil="true"/>
-        <AccountType/>
-      </UserInfo>
-    </APEditor>
-    <SourceTitle xmlns="4873beb7-5857-4685-be1f-d57550cc96cc" xsi:nil="true"/>
-    <OpenTemplate xmlns="4873beb7-5857-4685-be1f-d57550cc96cc">true</OpenTemplate>
-    <UALocComments xmlns="4873beb7-5857-4685-be1f-d57550cc96cc" xsi:nil="true"/>
-    <ParentAssetId xmlns="4873beb7-5857-4685-be1f-d57550cc96cc" xsi:nil="true"/>
-    <IntlLangReviewDate xmlns="4873beb7-5857-4685-be1f-d57550cc96cc" xsi:nil="true"/>
-    <FeatureTagsTaxHTField0 xmlns="4873beb7-5857-4685-be1f-d57550cc96cc">
-      <Terms xmlns="http://schemas.microsoft.com/office/infopath/2007/PartnerControls"/>
-    </FeatureTagsTaxHTField0>
-    <PublishStatusLookup xmlns="4873beb7-5857-4685-be1f-d57550cc96cc">
-      <Value>1360476</Value>
-    </PublishStatusLookup>
-    <Providers xmlns="4873beb7-5857-4685-be1f-d57550cc96cc" xsi:nil="true"/>
-    <MachineTranslated xmlns="4873beb7-5857-4685-be1f-d57550cc96cc">false</MachineTranslated>
-    <OriginalSourceMarket xmlns="4873beb7-5857-4685-be1f-d57550cc96cc" xsi:nil="true"/>
-    <APDescription xmlns="4873beb7-5857-4685-be1f-d57550cc96cc" xsi:nil="true"/>
-    <ClipArtFilename xmlns="4873beb7-5857-4685-be1f-d57550cc96cc" xsi:nil="true"/>
-    <ContentItem xmlns="4873beb7-5857-4685-be1f-d57550cc96cc" xsi:nil="true"/>
-    <TPInstallLocation xmlns="4873beb7-5857-4685-be1f-d57550cc96cc" xsi:nil="true"/>
-    <PublishTargets xmlns="4873beb7-5857-4685-be1f-d57550cc96cc">OfficeOnlineVNext</PublishTargets>
-    <TimesCloned xmlns="4873beb7-5857-4685-be1f-d57550cc96cc" xsi:nil="true"/>
-    <AssetStart xmlns="4873beb7-5857-4685-be1f-d57550cc96cc">2011-12-12T13:37:00+00:00</AssetStart>
-    <Provider xmlns="4873beb7-5857-4685-be1f-d57550cc96cc" xsi:nil="true"/>
-    <AcquiredFrom xmlns="4873beb7-5857-4685-be1f-d57550cc96cc">Internal MS</AcquiredFrom>
-    <FriendlyTitle xmlns="4873beb7-5857-4685-be1f-d57550cc96cc" xsi:nil="true"/>
-    <LastHandOff xmlns="4873beb7-5857-4685-be1f-d57550cc96cc" xsi:nil="true"/>
-    <TPClientViewer xmlns="4873beb7-5857-4685-be1f-d57550cc96cc" xsi:nil="true"/>
-    <UACurrentWords xmlns="4873beb7-5857-4685-be1f-d57550cc96cc" xsi:nil="true"/>
-    <ArtSampleDocs xmlns="4873beb7-5857-4685-be1f-d57550cc96cc" xsi:nil="true"/>
-    <UALocRecommendation xmlns="4873beb7-5857-4685-be1f-d57550cc96cc">Localize</UALocRecommendation>
-    <Manager xmlns="4873beb7-5857-4685-be1f-d57550cc96cc" xsi:nil="true"/>
-    <ShowIn xmlns="4873beb7-5857-4685-be1f-d57550cc96cc">Show everywhere</ShowIn>
-    <UANotes xmlns="4873beb7-5857-4685-be1f-d57550cc96cc" xsi:nil="true"/>
-    <TemplateStatus xmlns="4873beb7-5857-4685-be1f-d57550cc96cc">Complete</TemplateStatus>
-    <InternalTagsTaxHTField0 xmlns="4873beb7-5857-4685-be1f-d57550cc96cc">
-      <Terms xmlns="http://schemas.microsoft.com/office/infopath/2007/PartnerControls"/>
-    </InternalTagsTaxHTField0>
-    <CSXHash xmlns="4873beb7-5857-4685-be1f-d57550cc96cc" xsi:nil="true"/>
-    <Downloads xmlns="4873beb7-5857-4685-be1f-d57550cc96cc">0</Downloads>
-    <VoteCount xmlns="4873beb7-5857-4685-be1f-d57550cc96cc" xsi:nil="true"/>
-    <OOCacheId xmlns="4873beb7-5857-4685-be1f-d57550cc96cc" xsi:nil="true"/>
-    <IsDeleted xmlns="4873beb7-5857-4685-be1f-d57550cc96cc">false</IsDeleted>
-    <AssetExpire xmlns="4873beb7-5857-4685-be1f-d57550cc96cc">2035-01-01T08:00:00+00:00</AssetExpire>
-    <DSATActionTaken xmlns="4873beb7-5857-4685-be1f-d57550cc96cc" xsi:nil="true"/>
-    <CSXSubmissionMarket xmlns="4873beb7-5857-4685-be1f-d57550cc96cc" xsi:nil="true"/>
-    <TPExecutable xmlns="4873beb7-5857-4685-be1f-d57550cc96cc" xsi:nil="true"/>
-    <SubmitterId xmlns="4873beb7-5857-4685-be1f-d57550cc96cc" xsi:nil="true"/>
-    <EditorialTags xmlns="4873beb7-5857-4685-be1f-d57550cc96cc" xsi:nil="true"/>
-    <ApprovalLog xmlns="4873beb7-5857-4685-be1f-d57550cc96cc" xsi:nil="true"/>
-    <AssetType xmlns="4873beb7-5857-4685-be1f-d57550cc96cc">TP</AssetType>
-    <BugNumber xmlns="4873beb7-5857-4685-be1f-d57550cc96cc" xsi:nil="true"/>
-    <CSXSubmissionDate xmlns="4873beb7-5857-4685-be1f-d57550cc96cc" xsi:nil="true"/>
-    <CSXUpdate xmlns="4873beb7-5857-4685-be1f-d57550cc96cc">false</CSXUpdate>
-    <Milestone xmlns="4873beb7-5857-4685-be1f-d57550cc96cc" xsi:nil="true"/>
-    <RecommendationsModifier xmlns="4873beb7-5857-4685-be1f-d57550cc96cc" xsi:nil="true"/>
-    <OriginAsset xmlns="4873beb7-5857-4685-be1f-d57550cc96cc" xsi:nil="true"/>
-    <TPComponent xmlns="4873beb7-5857-4685-be1f-d57550cc96cc" xsi:nil="true"/>
-    <AssetId xmlns="4873beb7-5857-4685-be1f-d57550cc96cc">TP102801058</AssetId>
-    <IntlLocPriority xmlns="4873beb7-5857-4685-be1f-d57550cc96cc" xsi:nil="true"/>
-    <PolicheckWords xmlns="4873beb7-5857-4685-be1f-d57550cc96cc" xsi:nil="true"/>
-    <TPLaunchHelpLink xmlns="4873beb7-5857-4685-be1f-d57550cc96cc" xsi:nil="true"/>
-    <TPApplication xmlns="4873beb7-5857-4685-be1f-d57550cc96cc" xsi:nil="true"/>
-    <CrawlForDependencies xmlns="4873beb7-5857-4685-be1f-d57550cc96cc">false</CrawlForDependencies>
-    <HandoffToMSDN xmlns="4873beb7-5857-4685-be1f-d57550cc96cc" xsi:nil="true"/>
-    <PlannedPubDate xmlns="4873beb7-5857-4685-be1f-d57550cc96cc" xsi:nil="true"/>
-    <IntlLangReviewer xmlns="4873beb7-5857-4685-be1f-d57550cc96cc" xsi:nil="true"/>
-    <TrustLevel xmlns="4873beb7-5857-4685-be1f-d57550cc96cc">1 Microsoft Managed Content</TrustLevel>
-    <LocLastLocAttemptVersionLookup xmlns="4873beb7-5857-4685-be1f-d57550cc96cc">706496</LocLastLocAttemptVersionLookup>
-    <IsSearchable xmlns="4873beb7-5857-4685-be1f-d57550cc96cc">true</IsSearchable>
-    <TemplateTemplateType xmlns="4873beb7-5857-4685-be1f-d57550cc96cc">PowerPoint Presentation Template</TemplateTemplateType>
-    <CampaignTagsTaxHTField0 xmlns="4873beb7-5857-4685-be1f-d57550cc96cc">
-      <Terms xmlns="http://schemas.microsoft.com/office/infopath/2007/PartnerControls"/>
-    </CampaignTagsTaxHTField0>
-    <TPNamespace xmlns="4873beb7-5857-4685-be1f-d57550cc96cc" xsi:nil="true"/>
-    <TaxCatchAll xmlns="4873beb7-5857-4685-be1f-d57550cc96cc"/>
-    <Markets xmlns="4873beb7-5857-4685-be1f-d57550cc96cc"/>
-    <UAProjectedTotalWords xmlns="4873beb7-5857-4685-be1f-d57550cc96cc" xsi:nil="true"/>
-    <IntlLangReview xmlns="4873beb7-5857-4685-be1f-d57550cc96cc">false</IntlLangReview>
-    <OutputCachingOn xmlns="4873beb7-5857-4685-be1f-d57550cc96cc">false</OutputCachingOn>
-    <AverageRating xmlns="4873beb7-5857-4685-be1f-d57550cc96cc" xsi:nil="true"/>
-    <APAuthor xmlns="4873beb7-5857-4685-be1f-d57550cc96cc">
-      <UserInfo>
-        <DisplayName>REDMOND\v-soujap</DisplayName>
-        <AccountId>1954</AccountId>
-        <AccountType/>
-      </UserInfo>
-    </APAuthor>
-    <LocManualTestRequired xmlns="4873beb7-5857-4685-be1f-d57550cc96cc">false</LocManualTestRequired>
-    <TPCommandLine xmlns="4873beb7-5857-4685-be1f-d57550cc96cc" xsi:nil="true"/>
-    <TPAppVersion xmlns="4873beb7-5857-4685-be1f-d57550cc96cc" xsi:nil="true"/>
-    <EditorialStatus xmlns="4873beb7-5857-4685-be1f-d57550cc96cc">Complete</EditorialStatus>
-    <LastModifiedDateTime xmlns="4873beb7-5857-4685-be1f-d57550cc96cc" xsi:nil="true"/>
-    <ScenarioTagsTaxHTField0 xmlns="4873beb7-5857-4685-be1f-d57550cc96cc">
-      <Terms xmlns="http://schemas.microsoft.com/office/infopath/2007/PartnerControls"/>
-    </ScenarioTagsTaxHTField0>
-    <OriginalRelease xmlns="4873beb7-5857-4685-be1f-d57550cc96cc">14</OriginalRelease>
-    <TPLaunchHelpLinkType xmlns="4873beb7-5857-4685-be1f-d57550cc96cc">Template</TPLaunchHelpLinkType>
-    <LocalizationTagsTaxHTField0 xmlns="4873beb7-5857-4685-be1f-d57550cc96cc">
-      <Terms xmlns="http://schemas.microsoft.com/office/infopath/2007/PartnerControls"/>
-    </LocalizationTagsTaxHTField0>
-    <LocMarketGroupTiers2 xmlns="4873beb7-5857-4685-be1f-d57550cc96cc" xsi:nil="true"/>
-  </documentManagement>
-</p:properties>
-</file>
-
 <file path=customXml/itemProps1.xml><?xml version="1.0" encoding="utf-8"?>
 <ds:datastoreItem xmlns:ds="http://schemas.openxmlformats.org/officeDocument/2006/customXml" ds:itemID="{8D003AC8-209A-4321-A17C-1B7A20643390}">
   <ds:schemaRefs>
@@ -8022,6 +8045,22 @@
 </file>
 
 <file path=customXml/itemProps2.xml><?xml version="1.0" encoding="utf-8"?>
+<ds:datastoreItem xmlns:ds="http://schemas.openxmlformats.org/officeDocument/2006/customXml" ds:itemID="{4ED80E12-3BE9-4746-820E-FFB249F467F2}">
+  <ds:schemaRefs>
+    <ds:schemaRef ds:uri="http://schemas.microsoft.com/office/2006/documentManagement/types"/>
+    <ds:schemaRef ds:uri="http://purl.org/dc/elements/1.1/"/>
+    <ds:schemaRef ds:uri="http://schemas.microsoft.com/office/2006/metadata/properties"/>
+    <ds:schemaRef ds:uri="4873beb7-5857-4685-be1f-d57550cc96cc"/>
+    <ds:schemaRef ds:uri="http://schemas.openxmlformats.org/package/2006/metadata/core-properties"/>
+    <ds:schemaRef ds:uri="http://purl.org/dc/terms/"/>
+    <ds:schemaRef ds:uri="http://schemas.microsoft.com/office/infopath/2007/PartnerControls"/>
+    <ds:schemaRef ds:uri="http://www.w3.org/XML/1998/namespace"/>
+    <ds:schemaRef ds:uri="http://purl.org/dc/dcmitype/"/>
+  </ds:schemaRefs>
+</ds:datastoreItem>
+</file>
+
+<file path=customXml/itemProps3.xml><?xml version="1.0" encoding="utf-8"?>
 <ds:datastoreItem xmlns:ds="http://schemas.openxmlformats.org/officeDocument/2006/customXml" ds:itemID="{83ED4759-CFDD-43F0-817C-11D9197192BA}">
   <ds:schemaRefs>
     <ds:schemaRef ds:uri="http://schemas.microsoft.com/office/2006/metadata/contentType"/>
@@ -8037,20 +8076,4 @@
     <ds:schemaRef ds:uri="http://schemas.microsoft.com/internal/obd"/>
   </ds:schemaRefs>
 </ds:datastoreItem>
-</file>
-
-<file path=customXml/itemProps3.xml><?xml version="1.0" encoding="utf-8"?>
-<ds:datastoreItem xmlns:ds="http://schemas.openxmlformats.org/officeDocument/2006/customXml" ds:itemID="{4ED80E12-3BE9-4746-820E-FFB249F467F2}">
-  <ds:schemaRefs>
-    <ds:schemaRef ds:uri="http://schemas.microsoft.com/office/2006/documentManagement/types"/>
-    <ds:schemaRef ds:uri="http://purl.org/dc/elements/1.1/"/>
-    <ds:schemaRef ds:uri="http://schemas.microsoft.com/office/2006/metadata/properties"/>
-    <ds:schemaRef ds:uri="4873beb7-5857-4685-be1f-d57550cc96cc"/>
-    <ds:schemaRef ds:uri="http://schemas.openxmlformats.org/package/2006/metadata/core-properties"/>
-    <ds:schemaRef ds:uri="http://purl.org/dc/terms/"/>
-    <ds:schemaRef ds:uri="http://schemas.microsoft.com/office/infopath/2007/PartnerControls"/>
-    <ds:schemaRef ds:uri="http://www.w3.org/XML/1998/namespace"/>
-    <ds:schemaRef ds:uri="http://purl.org/dc/dcmitype/"/>
-  </ds:schemaRefs>
-</ds:datastoreItem>
 </file>
</xml_diff>